<commit_message>
ultimas alterações na presentação
</commit_message>
<xml_diff>
--- a/documentacao/Apresentação do Projeto individual.pptx
+++ b/documentacao/Apresentação do Projeto individual.pptx
@@ -5,7 +5,7 @@
     <p:sldMasterId id="2147483672" r:id="rId1"/>
   </p:sldMasterIdLst>
   <p:notesMasterIdLst>
-    <p:notesMasterId r:id="rId8"/>
+    <p:notesMasterId r:id="rId9"/>
   </p:notesMasterIdLst>
   <p:sldIdLst>
     <p:sldId id="261" r:id="rId2"/>
@@ -14,6 +14,7 @@
     <p:sldId id="259" r:id="rId5"/>
     <p:sldId id="260" r:id="rId6"/>
     <p:sldId id="262" r:id="rId7"/>
+    <p:sldId id="263" r:id="rId8"/>
   </p:sldIdLst>
   <p:sldSz cx="12192000" cy="6858000"/>
   <p:notesSz cx="6858000" cy="9144000"/>
@@ -112,6 +113,11 @@
       </a:defRPr>
     </a:lvl9pPr>
   </p:defaultTextStyle>
+  <p:extLst>
+    <p:ext uri="{EFAFB233-063F-42B5-8137-9DF3F51BA10A}">
+      <p15:sldGuideLst xmlns:p15="http://schemas.microsoft.com/office/powerpoint/2012/main"/>
+    </p:ext>
+  </p:extLst>
 </p:presentation>
 </file>
 
@@ -209,7 +215,7 @@
           <a:p>
             <a:fld id="{034A6A08-5F96-4FE2-9328-59EAC2C5CB80}" type="datetimeFigureOut">
               <a:rPr lang="pt-BR" smtClean="0"/>
-              <a:t>03/12/2020</a:t>
+              <a:t>04/12/2020</a:t>
             </a:fld>
             <a:endParaRPr lang="pt-BR"/>
           </a:p>
@@ -607,7 +613,7 @@
           <a:p>
             <a:fld id="{2E1F4FF0-0E5D-4CB9-B19B-7DC3D3391724}" type="datetimeFigureOut">
               <a:rPr lang="pt-BR" smtClean="0"/>
-              <a:t>03/12/2020</a:t>
+              <a:t>04/12/2020</a:t>
             </a:fld>
             <a:endParaRPr lang="pt-BR"/>
           </a:p>
@@ -777,7 +783,7 @@
           <a:p>
             <a:fld id="{2E1F4FF0-0E5D-4CB9-B19B-7DC3D3391724}" type="datetimeFigureOut">
               <a:rPr lang="pt-BR" smtClean="0"/>
-              <a:t>03/12/2020</a:t>
+              <a:t>04/12/2020</a:t>
             </a:fld>
             <a:endParaRPr lang="pt-BR"/>
           </a:p>
@@ -957,7 +963,7 @@
           <a:p>
             <a:fld id="{2E1F4FF0-0E5D-4CB9-B19B-7DC3D3391724}" type="datetimeFigureOut">
               <a:rPr lang="pt-BR" smtClean="0"/>
-              <a:t>03/12/2020</a:t>
+              <a:t>04/12/2020</a:t>
             </a:fld>
             <a:endParaRPr lang="pt-BR"/>
           </a:p>
@@ -1127,7 +1133,7 @@
           <a:p>
             <a:fld id="{2E1F4FF0-0E5D-4CB9-B19B-7DC3D3391724}" type="datetimeFigureOut">
               <a:rPr lang="pt-BR" smtClean="0"/>
-              <a:t>03/12/2020</a:t>
+              <a:t>04/12/2020</a:t>
             </a:fld>
             <a:endParaRPr lang="pt-BR"/>
           </a:p>
@@ -1373,7 +1379,7 @@
           <a:p>
             <a:fld id="{2E1F4FF0-0E5D-4CB9-B19B-7DC3D3391724}" type="datetimeFigureOut">
               <a:rPr lang="pt-BR" smtClean="0"/>
-              <a:t>03/12/2020</a:t>
+              <a:t>04/12/2020</a:t>
             </a:fld>
             <a:endParaRPr lang="pt-BR"/>
           </a:p>
@@ -1605,7 +1611,7 @@
           <a:p>
             <a:fld id="{2E1F4FF0-0E5D-4CB9-B19B-7DC3D3391724}" type="datetimeFigureOut">
               <a:rPr lang="pt-BR" smtClean="0"/>
-              <a:t>03/12/2020</a:t>
+              <a:t>04/12/2020</a:t>
             </a:fld>
             <a:endParaRPr lang="pt-BR"/>
           </a:p>
@@ -1972,7 +1978,7 @@
           <a:p>
             <a:fld id="{2E1F4FF0-0E5D-4CB9-B19B-7DC3D3391724}" type="datetimeFigureOut">
               <a:rPr lang="pt-BR" smtClean="0"/>
-              <a:t>03/12/2020</a:t>
+              <a:t>04/12/2020</a:t>
             </a:fld>
             <a:endParaRPr lang="pt-BR"/>
           </a:p>
@@ -2090,7 +2096,7 @@
           <a:p>
             <a:fld id="{2E1F4FF0-0E5D-4CB9-B19B-7DC3D3391724}" type="datetimeFigureOut">
               <a:rPr lang="pt-BR" smtClean="0"/>
-              <a:t>03/12/2020</a:t>
+              <a:t>04/12/2020</a:t>
             </a:fld>
             <a:endParaRPr lang="pt-BR"/>
           </a:p>
@@ -2185,7 +2191,7 @@
           <a:p>
             <a:fld id="{2E1F4FF0-0E5D-4CB9-B19B-7DC3D3391724}" type="datetimeFigureOut">
               <a:rPr lang="pt-BR" smtClean="0"/>
-              <a:t>03/12/2020</a:t>
+              <a:t>04/12/2020</a:t>
             </a:fld>
             <a:endParaRPr lang="pt-BR"/>
           </a:p>
@@ -2462,7 +2468,7 @@
           <a:p>
             <a:fld id="{2E1F4FF0-0E5D-4CB9-B19B-7DC3D3391724}" type="datetimeFigureOut">
               <a:rPr lang="pt-BR" smtClean="0"/>
-              <a:t>03/12/2020</a:t>
+              <a:t>04/12/2020</a:t>
             </a:fld>
             <a:endParaRPr lang="pt-BR"/>
           </a:p>
@@ -2719,7 +2725,7 @@
           <a:p>
             <a:fld id="{2E1F4FF0-0E5D-4CB9-B19B-7DC3D3391724}" type="datetimeFigureOut">
               <a:rPr lang="pt-BR" smtClean="0"/>
-              <a:t>03/12/2020</a:t>
+              <a:t>04/12/2020</a:t>
             </a:fld>
             <a:endParaRPr lang="pt-BR"/>
           </a:p>
@@ -2932,7 +2938,7 @@
           <a:p>
             <a:fld id="{2E1F4FF0-0E5D-4CB9-B19B-7DC3D3391724}" type="datetimeFigureOut">
               <a:rPr lang="pt-BR" smtClean="0"/>
-              <a:t>03/12/2020</a:t>
+              <a:t>04/12/2020</a:t>
             </a:fld>
             <a:endParaRPr lang="pt-BR"/>
           </a:p>
@@ -6053,6 +6059,19 @@
           </a:p>
           <a:p>
             <a:r>
+              <a:rPr lang="pt-BR" sz="2400" dirty="0" err="1">
+                <a:solidFill>
+                  <a:schemeClr val="bg2">
+                    <a:lumMod val="10000"/>
+                  </a:schemeClr>
+                </a:solidFill>
+                <a:latin typeface="Open Sans" panose="020B0606030504020204" pitchFamily="34" charset="0"/>
+                <a:ea typeface="Open Sans" panose="020B0606030504020204" pitchFamily="34" charset="0"/>
+                <a:cs typeface="Open Sans" panose="020B0606030504020204" pitchFamily="34" charset="0"/>
+              </a:rPr>
+              <a:t>Stefani</a:t>
+            </a:r>
+            <a:r>
               <a:rPr lang="pt-BR" sz="2400" dirty="0">
                 <a:solidFill>
                   <a:schemeClr val="bg2">
@@ -6063,7 +6082,7 @@
                 <a:ea typeface="Open Sans" panose="020B0606030504020204" pitchFamily="34" charset="0"/>
                 <a:cs typeface="Open Sans" panose="020B0606030504020204" pitchFamily="34" charset="0"/>
               </a:rPr>
-              <a:t>Stephanie Rayane</a:t>
+              <a:t> Rayane</a:t>
             </a:r>
           </a:p>
           <a:p>
@@ -6082,6 +6101,324 @@
     <p:extLst>
       <p:ext uri="{BB962C8B-B14F-4D97-AF65-F5344CB8AC3E}">
         <p14:creationId xmlns:p14="http://schemas.microsoft.com/office/powerpoint/2010/main" val="4162568455"/>
+      </p:ext>
+    </p:extLst>
+  </p:cSld>
+  <p:clrMapOvr>
+    <a:masterClrMapping/>
+  </p:clrMapOvr>
+</p:sld>
+</file>
+
+<file path=ppt/slides/slide7.xml><?xml version="1.0" encoding="utf-8"?>
+<p:sld xmlns:a="http://schemas.openxmlformats.org/drawingml/2006/main" xmlns:r="http://schemas.openxmlformats.org/officeDocument/2006/relationships" xmlns:p="http://schemas.openxmlformats.org/presentationml/2006/main">
+  <p:cSld>
+    <p:bg>
+      <p:bgPr>
+        <a:solidFill>
+          <a:schemeClr val="bg1"/>
+        </a:solidFill>
+        <a:effectLst/>
+      </p:bgPr>
+    </p:bg>
+    <p:spTree>
+      <p:nvGrpSpPr>
+        <p:cNvPr id="1" name=""/>
+        <p:cNvGrpSpPr/>
+        <p:nvPr/>
+      </p:nvGrpSpPr>
+      <p:grpSpPr>
+        <a:xfrm>
+          <a:off x="0" y="0"/>
+          <a:ext cx="0" cy="0"/>
+          <a:chOff x="0" y="0"/>
+          <a:chExt cx="0" cy="0"/>
+        </a:xfrm>
+      </p:grpSpPr>
+      <p:sp useBgFill="1">
+        <p:nvSpPr>
+          <p:cNvPr id="37" name="Rectangle 36">
+            <a:extLst>
+              <a:ext uri="{FF2B5EF4-FFF2-40B4-BE49-F238E27FC236}">
+                <a16:creationId xmlns:a16="http://schemas.microsoft.com/office/drawing/2014/main" id="{0E2F58BF-12E5-4B5A-AD25-4DAAA2742A7B}"/>
+              </a:ext>
+              <a:ext uri="{C183D7F6-B498-43B3-948B-1728B52AA6E4}">
+                <adec:decorative xmlns:adec="http://schemas.microsoft.com/office/drawing/2017/decorative" val="1"/>
+              </a:ext>
+            </a:extLst>
+          </p:cNvPr>
+          <p:cNvSpPr>
+            <a:spLocks noGrp="1" noRot="1" noChangeAspect="1" noMove="1" noResize="1" noEditPoints="1" noAdjustHandles="1" noChangeArrowheads="1" noChangeShapeType="1" noTextEdit="1"/>
+          </p:cNvSpPr>
+          <p:nvPr>
+            <p:extLst>
+              <p:ext uri="{386F3935-93C4-4BCD-93E2-E3B085C9AB24}">
+                <p16:designElem xmlns:p16="http://schemas.microsoft.com/office/powerpoint/2015/main" val="1"/>
+              </p:ext>
+            </p:extLst>
+          </p:nvPr>
+        </p:nvSpPr>
+        <p:spPr>
+          <a:xfrm>
+            <a:off x="0" y="0"/>
+            <a:ext cx="12192000" cy="6858000"/>
+          </a:xfrm>
+          <a:prstGeom prst="rect">
+            <a:avLst/>
+          </a:prstGeom>
+          <a:ln>
+            <a:noFill/>
+          </a:ln>
+        </p:spPr>
+        <p:style>
+          <a:lnRef idx="2">
+            <a:schemeClr val="accent1">
+              <a:shade val="50000"/>
+            </a:schemeClr>
+          </a:lnRef>
+          <a:fillRef idx="1">
+            <a:schemeClr val="accent1"/>
+          </a:fillRef>
+          <a:effectRef idx="0">
+            <a:schemeClr val="accent1"/>
+          </a:effectRef>
+          <a:fontRef idx="minor">
+            <a:schemeClr val="lt1"/>
+          </a:fontRef>
+        </p:style>
+        <p:txBody>
+          <a:bodyPr rtlCol="0" anchor="ctr"/>
+          <a:lstStyle/>
+          <a:p>
+            <a:pPr algn="ctr"/>
+            <a:endParaRPr lang="en-US"/>
+          </a:p>
+        </p:txBody>
+      </p:sp>
+      <p:sp>
+        <p:nvSpPr>
+          <p:cNvPr id="4" name="CaixaDeTexto 3">
+            <a:extLst>
+              <a:ext uri="{FF2B5EF4-FFF2-40B4-BE49-F238E27FC236}">
+                <a16:creationId xmlns:a16="http://schemas.microsoft.com/office/drawing/2014/main" id="{E971834F-59A9-4F12-B4BC-091C3328798D}"/>
+              </a:ext>
+            </a:extLst>
+          </p:cNvPr>
+          <p:cNvSpPr txBox="1"/>
+          <p:nvPr/>
+        </p:nvSpPr>
+        <p:spPr>
+          <a:xfrm>
+            <a:off x="477981" y="1122363"/>
+            <a:ext cx="4023360" cy="3204134"/>
+          </a:xfrm>
+          <a:prstGeom prst="rect">
+            <a:avLst/>
+          </a:prstGeom>
+        </p:spPr>
+        <p:txBody>
+          <a:bodyPr vert="horz" lIns="91440" tIns="45720" rIns="91440" bIns="45720" rtlCol="0" anchor="b">
+            <a:normAutofit/>
+          </a:bodyPr>
+          <a:lstStyle/>
+          <a:p>
+            <a:pPr defTabSz="914400">
+              <a:lnSpc>
+                <a:spcPct val="90000"/>
+              </a:lnSpc>
+              <a:spcBef>
+                <a:spcPct val="0"/>
+              </a:spcBef>
+              <a:spcAft>
+                <a:spcPts val="600"/>
+              </a:spcAft>
+            </a:pPr>
+            <a:r>
+              <a:rPr lang="en-US" sz="4800">
+                <a:latin typeface="+mj-lt"/>
+                <a:ea typeface="+mj-ea"/>
+                <a:cs typeface="+mj-cs"/>
+              </a:rPr>
+              <a:t>Muito obrigado!</a:t>
+            </a:r>
+          </a:p>
+        </p:txBody>
+      </p:sp>
+      <p:sp>
+        <p:nvSpPr>
+          <p:cNvPr id="39" name="Rectangle 38">
+            <a:extLst>
+              <a:ext uri="{FF2B5EF4-FFF2-40B4-BE49-F238E27FC236}">
+                <a16:creationId xmlns:a16="http://schemas.microsoft.com/office/drawing/2014/main" id="{AF2F604E-43BE-4DC3-B983-E071523364F8}"/>
+              </a:ext>
+              <a:ext uri="{C183D7F6-B498-43B3-948B-1728B52AA6E4}">
+                <adec:decorative xmlns:adec="http://schemas.microsoft.com/office/drawing/2017/decorative" val="1"/>
+              </a:ext>
+            </a:extLst>
+          </p:cNvPr>
+          <p:cNvSpPr>
+            <a:spLocks noGrp="1" noRot="1" noChangeAspect="1" noMove="1" noResize="1" noEditPoints="1" noAdjustHandles="1" noChangeArrowheads="1" noChangeShapeType="1" noTextEdit="1"/>
+          </p:cNvSpPr>
+          <p:nvPr>
+            <p:extLst>
+              <p:ext uri="{386F3935-93C4-4BCD-93E2-E3B085C9AB24}">
+                <p16:designElem xmlns:p16="http://schemas.microsoft.com/office/powerpoint/2015/main" val="1"/>
+              </p:ext>
+            </p:extLst>
+          </p:nvPr>
+        </p:nvSpPr>
+        <p:spPr>
+          <a:xfrm rot="5400000">
+            <a:off x="759921" y="346791"/>
+            <a:ext cx="146304" cy="704088"/>
+          </a:xfrm>
+          <a:prstGeom prst="rect">
+            <a:avLst/>
+          </a:prstGeom>
+          <a:solidFill>
+            <a:schemeClr val="accent2"/>
+          </a:solidFill>
+          <a:ln>
+            <a:noFill/>
+          </a:ln>
+        </p:spPr>
+        <p:style>
+          <a:lnRef idx="2">
+            <a:schemeClr val="accent1">
+              <a:shade val="50000"/>
+            </a:schemeClr>
+          </a:lnRef>
+          <a:fillRef idx="1">
+            <a:schemeClr val="accent1"/>
+          </a:fillRef>
+          <a:effectRef idx="0">
+            <a:schemeClr val="accent1"/>
+          </a:effectRef>
+          <a:fontRef idx="minor">
+            <a:schemeClr val="lt1"/>
+          </a:fontRef>
+        </p:style>
+        <p:txBody>
+          <a:bodyPr rtlCol="0" anchor="ctr"/>
+          <a:lstStyle/>
+          <a:p>
+            <a:pPr algn="ctr"/>
+            <a:endParaRPr lang="en-US">
+              <a:solidFill>
+                <a:prstClr val="white"/>
+              </a:solidFill>
+              <a:latin typeface="Calibri" panose="020F0502020204030204"/>
+            </a:endParaRPr>
+          </a:p>
+        </p:txBody>
+      </p:sp>
+      <p:sp>
+        <p:nvSpPr>
+          <p:cNvPr id="45" name="Rectangle 40">
+            <a:extLst>
+              <a:ext uri="{FF2B5EF4-FFF2-40B4-BE49-F238E27FC236}">
+                <a16:creationId xmlns:a16="http://schemas.microsoft.com/office/drawing/2014/main" id="{08C9B587-E65E-4B52-B37C-ABEBB6E87928}"/>
+              </a:ext>
+              <a:ext uri="{C183D7F6-B498-43B3-948B-1728B52AA6E4}">
+                <adec:decorative xmlns:adec="http://schemas.microsoft.com/office/drawing/2017/decorative" val="1"/>
+              </a:ext>
+            </a:extLst>
+          </p:cNvPr>
+          <p:cNvSpPr>
+            <a:spLocks noGrp="1" noRot="1" noChangeAspect="1" noMove="1" noResize="1" noEditPoints="1" noAdjustHandles="1" noChangeArrowheads="1" noChangeShapeType="1" noTextEdit="1"/>
+          </p:cNvSpPr>
+          <p:nvPr>
+            <p:extLst>
+              <p:ext uri="{386F3935-93C4-4BCD-93E2-E3B085C9AB24}">
+                <p16:designElem xmlns:p16="http://schemas.microsoft.com/office/powerpoint/2015/main" val="1"/>
+              </p:ext>
+            </p:extLst>
+          </p:nvPr>
+        </p:nvSpPr>
+        <p:spPr>
+          <a:xfrm>
+            <a:off x="481029" y="4546920"/>
+            <a:ext cx="4023360" cy="18288"/>
+          </a:xfrm>
+          <a:prstGeom prst="rect">
+            <a:avLst/>
+          </a:prstGeom>
+          <a:solidFill>
+            <a:srgbClr val="D5D5D5"/>
+          </a:solidFill>
+          <a:ln w="3175">
+            <a:noFill/>
+          </a:ln>
+          <a:effectLst/>
+        </p:spPr>
+        <p:style>
+          <a:lnRef idx="2">
+            <a:schemeClr val="accent1">
+              <a:shade val="50000"/>
+            </a:schemeClr>
+          </a:lnRef>
+          <a:fillRef idx="1">
+            <a:schemeClr val="accent1"/>
+          </a:fillRef>
+          <a:effectRef idx="0">
+            <a:schemeClr val="accent1"/>
+          </a:effectRef>
+          <a:fontRef idx="minor">
+            <a:schemeClr val="lt1"/>
+          </a:fontRef>
+        </p:style>
+        <p:txBody>
+          <a:bodyPr rtlCol="0" anchor="ctr"/>
+          <a:lstStyle/>
+          <a:p>
+            <a:pPr algn="ctr"/>
+            <a:endParaRPr lang="en-US">
+              <a:solidFill>
+                <a:prstClr val="white"/>
+              </a:solidFill>
+              <a:latin typeface="Calibri" panose="020F0502020204030204"/>
+            </a:endParaRPr>
+          </a:p>
+        </p:txBody>
+      </p:sp>
+      <p:pic>
+        <p:nvPicPr>
+          <p:cNvPr id="10" name="Imagem 9" descr="Padrão do plano de fundo&#10;&#10;Descrição gerada automaticamente">
+            <a:extLst>
+              <a:ext uri="{FF2B5EF4-FFF2-40B4-BE49-F238E27FC236}">
+                <a16:creationId xmlns:a16="http://schemas.microsoft.com/office/drawing/2014/main" id="{770094FB-B954-40BC-A4DF-78AE50C10184}"/>
+              </a:ext>
+            </a:extLst>
+          </p:cNvPr>
+          <p:cNvPicPr>
+            <a:picLocks noChangeAspect="1"/>
+          </p:cNvPicPr>
+          <p:nvPr/>
+        </p:nvPicPr>
+        <p:blipFill rotWithShape="1">
+          <a:blip r:embed="rId2">
+            <a:extLst>
+              <a:ext uri="{28A0092B-C50C-407E-A947-70E740481C1C}">
+                <a14:useLocalDpi xmlns:a14="http://schemas.microsoft.com/office/drawing/2010/main" val="0"/>
+              </a:ext>
+            </a:extLst>
+          </a:blip>
+          <a:stretch/>
+        </p:blipFill>
+        <p:spPr>
+          <a:xfrm>
+            <a:off x="4868485" y="10"/>
+            <a:ext cx="7323515" cy="6857990"/>
+          </a:xfrm>
+          <a:prstGeom prst="rect">
+            <a:avLst/>
+          </a:prstGeom>
+        </p:spPr>
+      </p:pic>
+    </p:spTree>
+    <p:extLst>
+      <p:ext uri="{BB962C8B-B14F-4D97-AF65-F5344CB8AC3E}">
+        <p14:creationId xmlns:p14="http://schemas.microsoft.com/office/powerpoint/2010/main" val="2555200464"/>
       </p:ext>
     </p:extLst>
   </p:cSld>

</xml_diff>